<commit_message>
Update for Annals of Botany archiving
Updating comments and code for Zenodo release.
</commit_message>
<xml_diff>
--- a/graphical model.pptx
+++ b/graphical model.pptx
@@ -261,7 +261,7 @@
           <a:p>
             <a:fld id="{EF9669B4-7E5C-4F3A-9B8C-2EC308A1980A}" type="datetimeFigureOut">
               <a:rPr lang="en-CA" smtClean="0"/>
-              <a:t>2019-05-01</a:t>
+              <a:t>2019-09-18</a:t>
             </a:fld>
             <a:endParaRPr lang="en-CA"/>
           </a:p>
@@ -461,7 +461,7 @@
           <a:p>
             <a:fld id="{EF9669B4-7E5C-4F3A-9B8C-2EC308A1980A}" type="datetimeFigureOut">
               <a:rPr lang="en-CA" smtClean="0"/>
-              <a:t>2019-05-01</a:t>
+              <a:t>2019-09-18</a:t>
             </a:fld>
             <a:endParaRPr lang="en-CA"/>
           </a:p>
@@ -671,7 +671,7 @@
           <a:p>
             <a:fld id="{EF9669B4-7E5C-4F3A-9B8C-2EC308A1980A}" type="datetimeFigureOut">
               <a:rPr lang="en-CA" smtClean="0"/>
-              <a:t>2019-05-01</a:t>
+              <a:t>2019-09-18</a:t>
             </a:fld>
             <a:endParaRPr lang="en-CA"/>
           </a:p>
@@ -871,7 +871,7 @@
           <a:p>
             <a:fld id="{EF9669B4-7E5C-4F3A-9B8C-2EC308A1980A}" type="datetimeFigureOut">
               <a:rPr lang="en-CA" smtClean="0"/>
-              <a:t>2019-05-01</a:t>
+              <a:t>2019-09-18</a:t>
             </a:fld>
             <a:endParaRPr lang="en-CA"/>
           </a:p>
@@ -1147,7 +1147,7 @@
           <a:p>
             <a:fld id="{EF9669B4-7E5C-4F3A-9B8C-2EC308A1980A}" type="datetimeFigureOut">
               <a:rPr lang="en-CA" smtClean="0"/>
-              <a:t>2019-05-01</a:t>
+              <a:t>2019-09-18</a:t>
             </a:fld>
             <a:endParaRPr lang="en-CA"/>
           </a:p>
@@ -1415,7 +1415,7 @@
           <a:p>
             <a:fld id="{EF9669B4-7E5C-4F3A-9B8C-2EC308A1980A}" type="datetimeFigureOut">
               <a:rPr lang="en-CA" smtClean="0"/>
-              <a:t>2019-05-01</a:t>
+              <a:t>2019-09-18</a:t>
             </a:fld>
             <a:endParaRPr lang="en-CA"/>
           </a:p>
@@ -1830,7 +1830,7 @@
           <a:p>
             <a:fld id="{EF9669B4-7E5C-4F3A-9B8C-2EC308A1980A}" type="datetimeFigureOut">
               <a:rPr lang="en-CA" smtClean="0"/>
-              <a:t>2019-05-01</a:t>
+              <a:t>2019-09-18</a:t>
             </a:fld>
             <a:endParaRPr lang="en-CA"/>
           </a:p>
@@ -1972,7 +1972,7 @@
           <a:p>
             <a:fld id="{EF9669B4-7E5C-4F3A-9B8C-2EC308A1980A}" type="datetimeFigureOut">
               <a:rPr lang="en-CA" smtClean="0"/>
-              <a:t>2019-05-01</a:t>
+              <a:t>2019-09-18</a:t>
             </a:fld>
             <a:endParaRPr lang="en-CA"/>
           </a:p>
@@ -2085,7 +2085,7 @@
           <a:p>
             <a:fld id="{EF9669B4-7E5C-4F3A-9B8C-2EC308A1980A}" type="datetimeFigureOut">
               <a:rPr lang="en-CA" smtClean="0"/>
-              <a:t>2019-05-01</a:t>
+              <a:t>2019-09-18</a:t>
             </a:fld>
             <a:endParaRPr lang="en-CA"/>
           </a:p>
@@ -2398,7 +2398,7 @@
           <a:p>
             <a:fld id="{EF9669B4-7E5C-4F3A-9B8C-2EC308A1980A}" type="datetimeFigureOut">
               <a:rPr lang="en-CA" smtClean="0"/>
-              <a:t>2019-05-01</a:t>
+              <a:t>2019-09-18</a:t>
             </a:fld>
             <a:endParaRPr lang="en-CA"/>
           </a:p>
@@ -2687,7 +2687,7 @@
           <a:p>
             <a:fld id="{EF9669B4-7E5C-4F3A-9B8C-2EC308A1980A}" type="datetimeFigureOut">
               <a:rPr lang="en-CA" smtClean="0"/>
-              <a:t>2019-05-01</a:t>
+              <a:t>2019-09-18</a:t>
             </a:fld>
             <a:endParaRPr lang="en-CA"/>
           </a:p>
@@ -2930,7 +2930,7 @@
           <a:p>
             <a:fld id="{EF9669B4-7E5C-4F3A-9B8C-2EC308A1980A}" type="datetimeFigureOut">
               <a:rPr lang="en-CA" smtClean="0"/>
-              <a:t>2019-05-01</a:t>
+              <a:t>2019-09-18</a:t>
             </a:fld>
             <a:endParaRPr lang="en-CA"/>
           </a:p>
@@ -3362,7 +3362,7 @@
         <p:spPr>
           <a:xfrm>
             <a:off x="7904481" y="1027169"/>
-            <a:ext cx="2993092" cy="4819643"/>
+            <a:ext cx="2993092" cy="5272927"/>
           </a:xfrm>
           <a:prstGeom prst="rect">
             <a:avLst/>
@@ -3417,7 +3417,7 @@
         <p:spPr>
           <a:xfrm>
             <a:off x="5622903" y="1025583"/>
-            <a:ext cx="2662104" cy="4819643"/>
+            <a:ext cx="2662104" cy="5272927"/>
           </a:xfrm>
           <a:prstGeom prst="rect">
             <a:avLst/>
@@ -3472,7 +3472,7 @@
         <p:spPr>
           <a:xfrm>
             <a:off x="2846327" y="1049014"/>
-            <a:ext cx="3001267" cy="4819643"/>
+            <a:ext cx="3001267" cy="5272927"/>
           </a:xfrm>
           <a:prstGeom prst="rect">
             <a:avLst/>
@@ -3526,8 +3526,8 @@
         </p:nvSpPr>
         <p:spPr>
           <a:xfrm>
-            <a:off x="1057650" y="1027097"/>
-            <a:ext cx="2906745" cy="4819643"/>
+            <a:off x="1502543" y="1058131"/>
+            <a:ext cx="2461852" cy="5238973"/>
           </a:xfrm>
           <a:prstGeom prst="rect">
             <a:avLst/>
@@ -3586,7 +3586,7 @@
         </p:nvSpPr>
         <p:spPr>
           <a:xfrm>
-            <a:off x="1777399" y="1601307"/>
+            <a:off x="1560108" y="1594110"/>
             <a:ext cx="722762" cy="646331"/>
           </a:xfrm>
           <a:prstGeom prst="rect">
@@ -3629,7 +3629,7 @@
         </p:nvSpPr>
         <p:spPr>
           <a:xfrm>
-            <a:off x="3138851" y="1770452"/>
+            <a:off x="3044556" y="1844753"/>
             <a:ext cx="710451" cy="369332"/>
           </a:xfrm>
           <a:prstGeom prst="rect">
@@ -3664,8 +3664,8 @@
         </p:nvSpPr>
         <p:spPr>
           <a:xfrm>
-            <a:off x="4183543" y="1778739"/>
-            <a:ext cx="1244764" cy="369332"/>
+            <a:off x="4296667" y="1778739"/>
+            <a:ext cx="915956" cy="369332"/>
           </a:xfrm>
           <a:prstGeom prst="rect">
             <a:avLst/>
@@ -3679,10 +3679,9 @@
           <a:lstStyle/>
           <a:p>
             <a:r>
-              <a:rPr lang="en-CA" dirty="0" err="1"/>
-              <a:t>Survival.Y.N</a:t>
-            </a:r>
-            <a:endParaRPr lang="en-CA" dirty="0"/>
+              <a:rPr lang="en-CA" dirty="0"/>
+              <a:t>Survival</a:t>
+            </a:r>
           </a:p>
         </p:txBody>
       </p:sp>
@@ -3700,7 +3699,7 @@
         </p:nvSpPr>
         <p:spPr>
           <a:xfrm>
-            <a:off x="4115109" y="2568782"/>
+            <a:off x="4275368" y="2568782"/>
             <a:ext cx="1290610" cy="369332"/>
           </a:xfrm>
           <a:prstGeom prst="rect">
@@ -3735,7 +3734,7 @@
         </p:nvSpPr>
         <p:spPr>
           <a:xfrm>
-            <a:off x="4151432" y="3214917"/>
+            <a:off x="4311691" y="3214917"/>
             <a:ext cx="1348126" cy="369332"/>
           </a:xfrm>
           <a:prstGeom prst="rect">
@@ -3770,7 +3769,7 @@
         </p:nvSpPr>
         <p:spPr>
           <a:xfrm>
-            <a:off x="4262079" y="3830843"/>
+            <a:off x="4422338" y="3830843"/>
             <a:ext cx="973343" cy="369332"/>
           </a:xfrm>
           <a:prstGeom prst="rect">
@@ -3805,7 +3804,7 @@
         </p:nvSpPr>
         <p:spPr>
           <a:xfrm>
-            <a:off x="4153613" y="4531700"/>
+            <a:off x="4313872" y="4531700"/>
             <a:ext cx="1301959" cy="369332"/>
           </a:xfrm>
           <a:prstGeom prst="rect">
@@ -3840,7 +3839,7 @@
         </p:nvSpPr>
         <p:spPr>
           <a:xfrm>
-            <a:off x="4151240" y="5162318"/>
+            <a:off x="4311499" y="5162318"/>
             <a:ext cx="1233030" cy="646331"/>
           </a:xfrm>
           <a:prstGeom prst="rect">
@@ -3887,10 +3886,10 @@
         </p:nvGrpSpPr>
         <p:grpSpPr>
           <a:xfrm>
-            <a:off x="2630235" y="1611317"/>
-            <a:ext cx="471347" cy="381171"/>
-            <a:chOff x="673860" y="1658421"/>
-            <a:chExt cx="471347" cy="381171"/>
+            <a:off x="2251848" y="1663812"/>
+            <a:ext cx="854721" cy="371744"/>
+            <a:chOff x="457042" y="1667848"/>
+            <a:chExt cx="854721" cy="371744"/>
           </a:xfrm>
         </p:grpSpPr>
         <p:cxnSp>
@@ -3951,8 +3950,8 @@
           </p:nvSpPr>
           <p:spPr>
             <a:xfrm>
-              <a:off x="673860" y="1658421"/>
-              <a:ext cx="471347" cy="307777"/>
+              <a:off x="457042" y="1667848"/>
+              <a:ext cx="854721" cy="307777"/>
             </a:xfrm>
             <a:prstGeom prst="rect">
               <a:avLst/>
@@ -3967,7 +3966,7 @@
             <a:p>
               <a:r>
                 <a:rPr lang="en-CA" sz="1400" b="1" i="1" dirty="0"/>
-                <a:t>Ber.</a:t>
+                <a:t>Bernoulli</a:t>
               </a:r>
             </a:p>
           </p:txBody>
@@ -3987,10 +3986,10 @@
         </p:nvGrpSpPr>
         <p:grpSpPr>
           <a:xfrm>
-            <a:off x="3750537" y="1658925"/>
-            <a:ext cx="471347" cy="371744"/>
-            <a:chOff x="607871" y="1667848"/>
-            <a:chExt cx="471347" cy="371744"/>
+            <a:off x="3590278" y="1649499"/>
+            <a:ext cx="854721" cy="409451"/>
+            <a:chOff x="485320" y="1630141"/>
+            <a:chExt cx="854721" cy="409451"/>
           </a:xfrm>
         </p:grpSpPr>
         <p:cxnSp>
@@ -4051,8 +4050,8 @@
           </p:nvSpPr>
           <p:spPr>
             <a:xfrm>
-              <a:off x="607871" y="1667848"/>
-              <a:ext cx="471347" cy="307777"/>
+              <a:off x="485320" y="1630141"/>
+              <a:ext cx="854721" cy="307777"/>
             </a:xfrm>
             <a:prstGeom prst="rect">
               <a:avLst/>
@@ -4067,7 +4066,7 @@
             <a:p>
               <a:r>
                 <a:rPr lang="en-CA" sz="1400" b="1" i="1" dirty="0"/>
-                <a:t>Ber.</a:t>
+                <a:t>Bernoulli</a:t>
               </a:r>
             </a:p>
           </p:txBody>
@@ -4087,10 +4086,10 @@
         </p:nvGrpSpPr>
         <p:grpSpPr>
           <a:xfrm rot="5400000">
-            <a:off x="4794142" y="2851549"/>
-            <a:ext cx="355066" cy="465512"/>
-            <a:chOff x="752727" y="1579554"/>
-            <a:chExt cx="355066" cy="465512"/>
+            <a:off x="5149007" y="2656945"/>
+            <a:ext cx="355065" cy="854721"/>
+            <a:chOff x="752728" y="1190344"/>
+            <a:chExt cx="355065" cy="854721"/>
           </a:xfrm>
         </p:grpSpPr>
         <p:cxnSp>
@@ -4151,8 +4150,8 @@
           </p:nvSpPr>
           <p:spPr>
             <a:xfrm rot="16200000">
-              <a:off x="673860" y="1658421"/>
-              <a:ext cx="465512" cy="307777"/>
+              <a:off x="479256" y="1463816"/>
+              <a:ext cx="854721" cy="307777"/>
             </a:xfrm>
             <a:prstGeom prst="rect">
               <a:avLst/>
@@ -4167,7 +4166,7 @@
             <a:p>
               <a:r>
                 <a:rPr lang="en-CA" sz="1400" b="1" i="1" dirty="0"/>
-                <a:t>Poi.</a:t>
+                <a:t>Bernoulli</a:t>
               </a:r>
             </a:p>
           </p:txBody>
@@ -4187,10 +4186,10 @@
         </p:nvGrpSpPr>
         <p:grpSpPr>
           <a:xfrm rot="5400000">
-            <a:off x="4789913" y="4167666"/>
-            <a:ext cx="355066" cy="465512"/>
-            <a:chOff x="752727" y="1579554"/>
-            <a:chExt cx="355066" cy="465512"/>
+            <a:off x="5333131" y="3784709"/>
+            <a:ext cx="355065" cy="1231427"/>
+            <a:chOff x="752728" y="813638"/>
+            <a:chExt cx="355065" cy="1231427"/>
           </a:xfrm>
         </p:grpSpPr>
         <p:cxnSp>
@@ -4251,8 +4250,8 @@
           </p:nvSpPr>
           <p:spPr>
             <a:xfrm rot="16200000">
-              <a:off x="673860" y="1658421"/>
-              <a:ext cx="465512" cy="307777"/>
+              <a:off x="290903" y="1275463"/>
+              <a:ext cx="1231427" cy="307777"/>
             </a:xfrm>
             <a:prstGeom prst="rect">
               <a:avLst/>
@@ -4267,7 +4266,7 @@
             <a:p>
               <a:r>
                 <a:rPr lang="en-CA" sz="1400" b="1" i="1" dirty="0"/>
-                <a:t>Poi.</a:t>
+                <a:t>Neg. binomial</a:t>
               </a:r>
             </a:p>
           </p:txBody>
@@ -4287,10 +4286,10 @@
         </p:nvGrpSpPr>
         <p:grpSpPr>
           <a:xfrm rot="5400000">
-            <a:off x="4791226" y="3506853"/>
-            <a:ext cx="355064" cy="471347"/>
-            <a:chOff x="752729" y="1573719"/>
-            <a:chExt cx="355064" cy="471347"/>
+            <a:off x="5331530" y="3126818"/>
+            <a:ext cx="355059" cy="1231427"/>
+            <a:chOff x="752734" y="813639"/>
+            <a:chExt cx="355059" cy="1231427"/>
           </a:xfrm>
         </p:grpSpPr>
         <p:cxnSp>
@@ -4351,8 +4350,8 @@
           </p:nvSpPr>
           <p:spPr>
             <a:xfrm rot="16200000">
-              <a:off x="670944" y="1655504"/>
-              <a:ext cx="471347" cy="307777"/>
+              <a:off x="290909" y="1275464"/>
+              <a:ext cx="1231427" cy="307777"/>
             </a:xfrm>
             <a:prstGeom prst="rect">
               <a:avLst/>
@@ -4367,7 +4366,7 @@
             <a:p>
               <a:r>
                 <a:rPr lang="en-CA" sz="1400" b="1" i="1" dirty="0"/>
-                <a:t>Ber.</a:t>
+                <a:t>Neg. binomial</a:t>
               </a:r>
             </a:p>
           </p:txBody>
@@ -4387,10 +4386,10 @@
         </p:nvGrpSpPr>
         <p:grpSpPr>
           <a:xfrm rot="5400000">
-            <a:off x="4812314" y="4798808"/>
-            <a:ext cx="355066" cy="465512"/>
-            <a:chOff x="752727" y="1579554"/>
-            <a:chExt cx="355066" cy="465512"/>
+            <a:off x="5355531" y="4415851"/>
+            <a:ext cx="355066" cy="1231427"/>
+            <a:chOff x="752727" y="813639"/>
+            <a:chExt cx="355066" cy="1231427"/>
           </a:xfrm>
         </p:grpSpPr>
         <p:cxnSp>
@@ -4451,8 +4450,8 @@
           </p:nvSpPr>
           <p:spPr>
             <a:xfrm rot="16200000">
-              <a:off x="673860" y="1658421"/>
-              <a:ext cx="465512" cy="307777"/>
+              <a:off x="290902" y="1275464"/>
+              <a:ext cx="1231427" cy="307777"/>
             </a:xfrm>
             <a:prstGeom prst="rect">
               <a:avLst/>
@@ -4467,7 +4466,7 @@
             <a:p>
               <a:r>
                 <a:rPr lang="en-CA" sz="1400" b="1" i="1" dirty="0"/>
-                <a:t>Poi.</a:t>
+                <a:t>Neg. binomial</a:t>
               </a:r>
             </a:p>
           </p:txBody>
@@ -4488,7 +4487,7 @@
         <p:spPr>
           <a:xfrm>
             <a:off x="6310491" y="1792142"/>
-            <a:ext cx="1441741" cy="369332"/>
+            <a:ext cx="915956" cy="369332"/>
           </a:xfrm>
           <a:prstGeom prst="rect">
             <a:avLst/>
@@ -4503,7 +4502,7 @@
           <a:p>
             <a:r>
               <a:rPr lang="en-CA" dirty="0"/>
-              <a:t>Survival.2017</a:t>
+              <a:t>Survival</a:t>
             </a:r>
           </a:p>
         </p:txBody>
@@ -4557,10 +4556,10 @@
         </p:nvGrpSpPr>
         <p:grpSpPr>
           <a:xfrm>
-            <a:off x="5619038" y="1611655"/>
-            <a:ext cx="471347" cy="381171"/>
-            <a:chOff x="673860" y="1658421"/>
-            <a:chExt cx="471347" cy="381171"/>
+            <a:off x="5420804" y="1666946"/>
+            <a:ext cx="854721" cy="380928"/>
+            <a:chOff x="522326" y="1658664"/>
+            <a:chExt cx="854721" cy="380928"/>
           </a:xfrm>
         </p:grpSpPr>
         <p:cxnSp>
@@ -4621,8 +4620,8 @@
           </p:nvSpPr>
           <p:spPr>
             <a:xfrm>
-              <a:off x="673860" y="1658421"/>
-              <a:ext cx="471347" cy="307777"/>
+              <a:off x="522326" y="1658664"/>
+              <a:ext cx="854721" cy="307777"/>
             </a:xfrm>
             <a:prstGeom prst="rect">
               <a:avLst/>
@@ -4637,7 +4636,7 @@
             <a:p>
               <a:r>
                 <a:rPr lang="en-CA" sz="1400" b="1" i="1" dirty="0"/>
-                <a:t>Ber.</a:t>
+                <a:t>Bernoulli</a:t>
               </a:r>
             </a:p>
           </p:txBody>
@@ -4657,10 +4656,10 @@
         </p:nvGrpSpPr>
         <p:grpSpPr>
           <a:xfrm rot="5400000">
-            <a:off x="7006962" y="2146763"/>
-            <a:ext cx="346248" cy="471347"/>
-            <a:chOff x="773741" y="1576636"/>
-            <a:chExt cx="346248" cy="471347"/>
+            <a:off x="7195706" y="1911656"/>
+            <a:ext cx="352138" cy="854721"/>
+            <a:chOff x="755655" y="1193262"/>
+            <a:chExt cx="352138" cy="854721"/>
           </a:xfrm>
         </p:grpSpPr>
         <p:cxnSp>
@@ -4721,8 +4720,8 @@
           </p:nvSpPr>
           <p:spPr>
             <a:xfrm rot="16200000">
-              <a:off x="730427" y="1658421"/>
-              <a:ext cx="471347" cy="307777"/>
+              <a:off x="482183" y="1466734"/>
+              <a:ext cx="854721" cy="307777"/>
             </a:xfrm>
             <a:prstGeom prst="rect">
               <a:avLst/>
@@ -4737,7 +4736,7 @@
             <a:p>
               <a:r>
                 <a:rPr lang="en-CA" sz="1400" b="1" i="1" dirty="0"/>
-                <a:t>Ber.</a:t>
+                <a:t>Bernoulli</a:t>
               </a:r>
             </a:p>
           </p:txBody>
@@ -4862,10 +4861,10 @@
         </p:nvGrpSpPr>
         <p:grpSpPr>
           <a:xfrm rot="5400000">
-            <a:off x="7102709" y="4044210"/>
-            <a:ext cx="355066" cy="465512"/>
-            <a:chOff x="752727" y="1579554"/>
-            <a:chExt cx="355066" cy="465512"/>
+            <a:off x="7485668" y="3661253"/>
+            <a:ext cx="355065" cy="1231427"/>
+            <a:chOff x="752728" y="813638"/>
+            <a:chExt cx="355065" cy="1231427"/>
           </a:xfrm>
         </p:grpSpPr>
         <p:cxnSp>
@@ -4926,8 +4925,8 @@
           </p:nvSpPr>
           <p:spPr>
             <a:xfrm rot="16200000">
-              <a:off x="673860" y="1658421"/>
-              <a:ext cx="465512" cy="307777"/>
+              <a:off x="290903" y="1275463"/>
+              <a:ext cx="1231427" cy="307777"/>
             </a:xfrm>
             <a:prstGeom prst="rect">
               <a:avLst/>
@@ -4942,7 +4941,7 @@
             <a:p>
               <a:r>
                 <a:rPr lang="en-CA" sz="1400" b="1" i="1" dirty="0"/>
-                <a:t>Poi.</a:t>
+                <a:t>Neg. binomial</a:t>
               </a:r>
             </a:p>
           </p:txBody>
@@ -4962,10 +4961,10 @@
         </p:nvGrpSpPr>
         <p:grpSpPr>
           <a:xfrm rot="5400000">
-            <a:off x="7094319" y="3429005"/>
-            <a:ext cx="355064" cy="471347"/>
-            <a:chOff x="752729" y="1573719"/>
-            <a:chExt cx="355064" cy="471347"/>
+            <a:off x="7474360" y="3048966"/>
+            <a:ext cx="355063" cy="1231427"/>
+            <a:chOff x="752730" y="813639"/>
+            <a:chExt cx="355063" cy="1231427"/>
           </a:xfrm>
         </p:grpSpPr>
         <p:cxnSp>
@@ -5026,8 +5025,8 @@
           </p:nvSpPr>
           <p:spPr>
             <a:xfrm rot="16200000">
-              <a:off x="670944" y="1655504"/>
-              <a:ext cx="471347" cy="307777"/>
+              <a:off x="290905" y="1275464"/>
+              <a:ext cx="1231427" cy="307777"/>
             </a:xfrm>
             <a:prstGeom prst="rect">
               <a:avLst/>
@@ -5042,7 +5041,7 @@
             <a:p>
               <a:r>
                 <a:rPr lang="en-CA" sz="1400" b="1" i="1" dirty="0"/>
-                <a:t>Ber.</a:t>
+                <a:t>Neg. binomial</a:t>
               </a:r>
             </a:p>
           </p:txBody>
@@ -5062,10 +5061,10 @@
         </p:nvGrpSpPr>
         <p:grpSpPr>
           <a:xfrm rot="5400000">
-            <a:off x="7106256" y="4656498"/>
-            <a:ext cx="355066" cy="465512"/>
-            <a:chOff x="752727" y="1579554"/>
-            <a:chExt cx="355066" cy="465512"/>
+            <a:off x="7489215" y="4273541"/>
+            <a:ext cx="355065" cy="1231427"/>
+            <a:chOff x="752728" y="813638"/>
+            <a:chExt cx="355065" cy="1231427"/>
           </a:xfrm>
         </p:grpSpPr>
         <p:cxnSp>
@@ -5126,8 +5125,8 @@
           </p:nvSpPr>
           <p:spPr>
             <a:xfrm rot="16200000">
-              <a:off x="673860" y="1658421"/>
-              <a:ext cx="465512" cy="307777"/>
+              <a:off x="290903" y="1275463"/>
+              <a:ext cx="1231427" cy="307777"/>
             </a:xfrm>
             <a:prstGeom prst="rect">
               <a:avLst/>
@@ -5142,7 +5141,7 @@
             <a:p>
               <a:r>
                 <a:rPr lang="en-CA" sz="1400" b="1" i="1" dirty="0"/>
-                <a:t>Poi.</a:t>
+                <a:t>Neg. binomial</a:t>
               </a:r>
             </a:p>
           </p:txBody>
@@ -5162,10 +5161,10 @@
         </p:nvGrpSpPr>
         <p:grpSpPr>
           <a:xfrm rot="5400000">
-            <a:off x="7070032" y="2762190"/>
-            <a:ext cx="355066" cy="465512"/>
-            <a:chOff x="752727" y="1579554"/>
-            <a:chExt cx="355066" cy="465512"/>
+            <a:off x="7264638" y="2567586"/>
+            <a:ext cx="355065" cy="854721"/>
+            <a:chOff x="752728" y="1190344"/>
+            <a:chExt cx="355065" cy="854721"/>
           </a:xfrm>
         </p:grpSpPr>
         <p:cxnSp>
@@ -5226,8 +5225,8 @@
           </p:nvSpPr>
           <p:spPr>
             <a:xfrm rot="16200000">
-              <a:off x="673860" y="1658421"/>
-              <a:ext cx="465512" cy="307777"/>
+              <a:off x="479256" y="1463816"/>
+              <a:ext cx="854721" cy="307777"/>
             </a:xfrm>
             <a:prstGeom prst="rect">
               <a:avLst/>
@@ -5242,7 +5241,7 @@
             <a:p>
               <a:r>
                 <a:rPr lang="en-CA" sz="1400" b="1" i="1" dirty="0"/>
-                <a:t>Poi.</a:t>
+                <a:t>Bernoulli</a:t>
               </a:r>
             </a:p>
           </p:txBody>
@@ -5313,7 +5312,7 @@
         <p:spPr>
           <a:xfrm>
             <a:off x="8739884" y="1740216"/>
-            <a:ext cx="1441741" cy="369332"/>
+            <a:ext cx="915956" cy="369332"/>
           </a:xfrm>
           <a:prstGeom prst="rect">
             <a:avLst/>
@@ -5328,7 +5327,7 @@
           <a:p>
             <a:r>
               <a:rPr lang="en-CA" dirty="0"/>
-              <a:t>Survival.2018</a:t>
+              <a:t>Survival</a:t>
             </a:r>
           </a:p>
         </p:txBody>
@@ -5382,10 +5381,10 @@
         </p:nvGrpSpPr>
         <p:grpSpPr>
           <a:xfrm>
-            <a:off x="8037964" y="1537923"/>
-            <a:ext cx="471347" cy="381171"/>
-            <a:chOff x="673860" y="1658421"/>
-            <a:chExt cx="471347" cy="381171"/>
+            <a:off x="7725371" y="1658926"/>
+            <a:ext cx="854721" cy="371744"/>
+            <a:chOff x="494750" y="1667848"/>
+            <a:chExt cx="854721" cy="371744"/>
           </a:xfrm>
         </p:grpSpPr>
         <p:cxnSp>
@@ -5446,8 +5445,8 @@
           </p:nvSpPr>
           <p:spPr>
             <a:xfrm>
-              <a:off x="673860" y="1658421"/>
-              <a:ext cx="471347" cy="307777"/>
+              <a:off x="494750" y="1667848"/>
+              <a:ext cx="854721" cy="307777"/>
             </a:xfrm>
             <a:prstGeom prst="rect">
               <a:avLst/>
@@ -5462,7 +5461,7 @@
             <a:p>
               <a:r>
                 <a:rPr lang="en-CA" sz="1400" b="1" i="1" dirty="0"/>
-                <a:t>Ber.</a:t>
+                <a:t>Bernoulli</a:t>
               </a:r>
             </a:p>
           </p:txBody>
@@ -5482,10 +5481,10 @@
         </p:nvGrpSpPr>
         <p:grpSpPr>
           <a:xfrm rot="5400000">
-            <a:off x="9302713" y="2001088"/>
-            <a:ext cx="352148" cy="471347"/>
-            <a:chOff x="755645" y="1576636"/>
-            <a:chExt cx="352148" cy="471347"/>
+            <a:off x="9598719" y="1846280"/>
+            <a:ext cx="334052" cy="854721"/>
+            <a:chOff x="773741" y="1193262"/>
+            <a:chExt cx="334052" cy="854721"/>
           </a:xfrm>
         </p:grpSpPr>
         <p:cxnSp>
@@ -5546,8 +5545,8 @@
           </p:nvSpPr>
           <p:spPr>
             <a:xfrm rot="16200000">
-              <a:off x="673860" y="1658421"/>
-              <a:ext cx="471347" cy="307777"/>
+              <a:off x="501027" y="1466734"/>
+              <a:ext cx="854721" cy="307777"/>
             </a:xfrm>
             <a:prstGeom prst="rect">
               <a:avLst/>
@@ -5562,7 +5561,7 @@
             <a:p>
               <a:r>
                 <a:rPr lang="en-CA" sz="1400" b="1" i="1" dirty="0"/>
-                <a:t>Ber.</a:t>
+                <a:t>Bernoulli</a:t>
               </a:r>
             </a:p>
           </p:txBody>
@@ -5687,10 +5686,10 @@
         </p:nvGrpSpPr>
         <p:grpSpPr>
           <a:xfrm rot="5400000">
-            <a:off x="9437378" y="4114475"/>
-            <a:ext cx="355066" cy="465512"/>
-            <a:chOff x="752727" y="1579554"/>
-            <a:chExt cx="355066" cy="465512"/>
+            <a:off x="9820337" y="3731518"/>
+            <a:ext cx="355065" cy="1231427"/>
+            <a:chOff x="752728" y="813638"/>
+            <a:chExt cx="355065" cy="1231427"/>
           </a:xfrm>
         </p:grpSpPr>
         <p:cxnSp>
@@ -5751,8 +5750,8 @@
           </p:nvSpPr>
           <p:spPr>
             <a:xfrm rot="16200000">
-              <a:off x="673860" y="1658421"/>
-              <a:ext cx="465512" cy="307777"/>
+              <a:off x="290903" y="1275463"/>
+              <a:ext cx="1231427" cy="307777"/>
             </a:xfrm>
             <a:prstGeom prst="rect">
               <a:avLst/>
@@ -5767,7 +5766,7 @@
             <a:p>
               <a:r>
                 <a:rPr lang="en-CA" sz="1400" b="1" i="1" dirty="0"/>
-                <a:t>Poi.</a:t>
+                <a:t>Neg. binomial</a:t>
               </a:r>
             </a:p>
           </p:txBody>
@@ -5787,10 +5786,10 @@
         </p:nvGrpSpPr>
         <p:grpSpPr>
           <a:xfrm rot="5400000">
-            <a:off x="9428988" y="3499270"/>
-            <a:ext cx="355064" cy="471347"/>
-            <a:chOff x="752729" y="1573719"/>
-            <a:chExt cx="355064" cy="471347"/>
+            <a:off x="9809028" y="3119230"/>
+            <a:ext cx="355064" cy="1231427"/>
+            <a:chOff x="752729" y="813639"/>
+            <a:chExt cx="355064" cy="1231427"/>
           </a:xfrm>
         </p:grpSpPr>
         <p:cxnSp>
@@ -5851,8 +5850,8 @@
           </p:nvSpPr>
           <p:spPr>
             <a:xfrm rot="16200000">
-              <a:off x="670944" y="1655504"/>
-              <a:ext cx="471347" cy="307777"/>
+              <a:off x="290904" y="1275464"/>
+              <a:ext cx="1231427" cy="307777"/>
             </a:xfrm>
             <a:prstGeom prst="rect">
               <a:avLst/>
@@ -5867,7 +5866,7 @@
             <a:p>
               <a:r>
                 <a:rPr lang="en-CA" sz="1400" b="1" i="1" dirty="0"/>
-                <a:t>Ber.</a:t>
+                <a:t>Neg. binomial</a:t>
               </a:r>
             </a:p>
           </p:txBody>
@@ -5887,10 +5886,10 @@
         </p:nvGrpSpPr>
         <p:grpSpPr>
           <a:xfrm rot="5400000">
-            <a:off x="9440925" y="4726763"/>
-            <a:ext cx="355066" cy="465512"/>
-            <a:chOff x="752727" y="1579554"/>
-            <a:chExt cx="355066" cy="465512"/>
+            <a:off x="9823884" y="4343806"/>
+            <a:ext cx="355065" cy="1231427"/>
+            <a:chOff x="752728" y="813638"/>
+            <a:chExt cx="355065" cy="1231427"/>
           </a:xfrm>
         </p:grpSpPr>
         <p:cxnSp>
@@ -5951,8 +5950,8 @@
           </p:nvSpPr>
           <p:spPr>
             <a:xfrm rot="16200000">
-              <a:off x="673860" y="1658421"/>
-              <a:ext cx="465512" cy="307777"/>
+              <a:off x="290903" y="1275463"/>
+              <a:ext cx="1231427" cy="307777"/>
             </a:xfrm>
             <a:prstGeom prst="rect">
               <a:avLst/>
@@ -5967,7 +5966,7 @@
             <a:p>
               <a:r>
                 <a:rPr lang="en-CA" sz="1400" b="1" i="1" dirty="0"/>
-                <a:t>Poi.</a:t>
+                <a:t>Neg. binomial</a:t>
               </a:r>
             </a:p>
           </p:txBody>
@@ -5987,10 +5986,10 @@
         </p:nvGrpSpPr>
         <p:grpSpPr>
           <a:xfrm rot="5400000">
-            <a:off x="9426070" y="2767016"/>
-            <a:ext cx="355066" cy="465512"/>
-            <a:chOff x="752727" y="1579554"/>
-            <a:chExt cx="355066" cy="465512"/>
+            <a:off x="9620676" y="2572412"/>
+            <a:ext cx="355065" cy="854721"/>
+            <a:chOff x="752728" y="1190344"/>
+            <a:chExt cx="355065" cy="854721"/>
           </a:xfrm>
         </p:grpSpPr>
         <p:cxnSp>
@@ -6051,8 +6050,8 @@
           </p:nvSpPr>
           <p:spPr>
             <a:xfrm rot="16200000">
-              <a:off x="673860" y="1658421"/>
-              <a:ext cx="465512" cy="307777"/>
+              <a:off x="479256" y="1463816"/>
+              <a:ext cx="854721" cy="307777"/>
             </a:xfrm>
             <a:prstGeom prst="rect">
               <a:avLst/>
@@ -6067,7 +6066,7 @@
             <a:p>
               <a:r>
                 <a:rPr lang="en-CA" sz="1400" b="1" i="1" dirty="0"/>
-                <a:t>Poi.</a:t>
+                <a:t>Bernoulli</a:t>
               </a:r>
             </a:p>
           </p:txBody>
@@ -6137,8 +6136,8 @@
         </p:nvSpPr>
         <p:spPr>
           <a:xfrm>
-            <a:off x="1755982" y="1179856"/>
-            <a:ext cx="1331005" cy="369332"/>
+            <a:off x="2136011" y="1039586"/>
+            <a:ext cx="1342675" cy="646331"/>
           </a:xfrm>
           <a:prstGeom prst="rect">
             <a:avLst/>
@@ -6151,9 +6150,17 @@
           </a:bodyPr>
           <a:lstStyle/>
           <a:p>
+            <a:pPr algn="ctr"/>
             <a:r>
               <a:rPr lang="en-CA" b="1" dirty="0"/>
               <a:t>Greenhouse</a:t>
+            </a:r>
+          </a:p>
+          <a:p>
+            <a:pPr algn="ctr"/>
+            <a:r>
+              <a:rPr lang="en-CA" b="1" dirty="0"/>
+              <a:t>(2015)</a:t>
             </a:r>
           </a:p>
         </p:txBody>
@@ -6213,7 +6220,7 @@
         </p:nvSpPr>
         <p:spPr>
           <a:xfrm>
-            <a:off x="6579308" y="1011188"/>
+            <a:off x="6700978" y="1039585"/>
             <a:ext cx="793807" cy="646331"/>
           </a:xfrm>
           <a:prstGeom prst="rect">
@@ -6386,58 +6393,6 @@
           </a:p>
         </p:txBody>
       </p:sp>
-      <p:sp>
-        <p:nvSpPr>
-          <p:cNvPr id="111" name="TextBox 110">
-            <a:extLst>
-              <a:ext uri="{FF2B5EF4-FFF2-40B4-BE49-F238E27FC236}">
-                <a16:creationId xmlns:a16="http://schemas.microsoft.com/office/drawing/2014/main" id="{77D0FD01-B565-4441-818F-02E844A760FD}"/>
-              </a:ext>
-            </a:extLst>
-          </p:cNvPr>
-          <p:cNvSpPr txBox="1"/>
-          <p:nvPr/>
-        </p:nvSpPr>
-        <p:spPr>
-          <a:xfrm>
-            <a:off x="1197758" y="6262467"/>
-            <a:ext cx="9453165" cy="369332"/>
-          </a:xfrm>
-          <a:prstGeom prst="rect">
-            <a:avLst/>
-          </a:prstGeom>
-          <a:noFill/>
-        </p:spPr>
-        <p:txBody>
-          <a:bodyPr wrap="none" rtlCol="0">
-            <a:spAutoFit/>
-          </a:bodyPr>
-          <a:lstStyle/>
-          <a:p>
-            <a:r>
-              <a:rPr lang="en-CA" dirty="0"/>
-              <a:t>Note: Flw.201</a:t>
-            </a:r>
-            <a:r>
-              <a:rPr lang="en-CA" u="sng" dirty="0"/>
-              <a:t>x</a:t>
-            </a:r>
-            <a:r>
-              <a:rPr lang="en-CA" dirty="0"/>
-              <a:t> and Frt.201</a:t>
-            </a:r>
-            <a:r>
-              <a:rPr lang="en-CA" u="sng" dirty="0"/>
-              <a:t>x</a:t>
-            </a:r>
-            <a:r>
-              <a:rPr lang="en-CA" dirty="0"/>
-              <a:t> may be uninformative nodes and therefore removed (I will check this).</a:t>
-            </a:r>
-            <a:endParaRPr lang="en-CA" u="sng" dirty="0"/>
-          </a:p>
-        </p:txBody>
-      </p:sp>
       <p:grpSp>
         <p:nvGrpSpPr>
           <p:cNvPr id="101" name="Group 100">
@@ -6452,10 +6407,10 @@
         </p:nvGrpSpPr>
         <p:grpSpPr>
           <a:xfrm rot="5400000">
-            <a:off x="4782908" y="2124590"/>
-            <a:ext cx="352148" cy="471347"/>
-            <a:chOff x="755645" y="1576636"/>
-            <a:chExt cx="352148" cy="471347"/>
+            <a:off x="5106574" y="1932904"/>
+            <a:ext cx="352147" cy="854721"/>
+            <a:chOff x="755646" y="1193262"/>
+            <a:chExt cx="352147" cy="854721"/>
           </a:xfrm>
         </p:grpSpPr>
         <p:cxnSp>
@@ -6516,8 +6471,8 @@
           </p:nvSpPr>
           <p:spPr>
             <a:xfrm rot="16200000">
-              <a:off x="673860" y="1658421"/>
-              <a:ext cx="471347" cy="307777"/>
+              <a:off x="482174" y="1466734"/>
+              <a:ext cx="854721" cy="307777"/>
             </a:xfrm>
             <a:prstGeom prst="rect">
               <a:avLst/>
@@ -6532,7 +6487,7 @@
             <a:p>
               <a:r>
                 <a:rPr lang="en-CA" sz="1400" b="1" i="1" dirty="0"/>
-                <a:t>Ber.</a:t>
+                <a:t>Bernoulli</a:t>
               </a:r>
             </a:p>
           </p:txBody>

</xml_diff>